<commit_message>
Fixed bullet points in class1
</commit_message>
<xml_diff>
--- a/201801/Clase1.pptx
+++ b/201801/Clase1.pptx
@@ -3196,7 +3196,7 @@
         <p:spPr>
           <a:xfrm>
             <a:off x="-9000" y="5213880"/>
-            <a:ext cx="8385480" cy="512640"/>
+            <a:ext cx="8384400" cy="511560"/>
           </a:xfrm>
           <a:prstGeom prst="rect">
             <a:avLst/>
@@ -3678,7 +3678,7 @@
         <p:spPr>
           <a:xfrm>
             <a:off x="-9000" y="5213880"/>
-            <a:ext cx="8386200" cy="513360"/>
+            <a:ext cx="8385120" cy="512280"/>
           </a:xfrm>
           <a:prstGeom prst="rect">
             <a:avLst/>
@@ -4150,7 +4150,7 @@
         <p:spPr>
           <a:xfrm>
             <a:off x="3200400" y="417240"/>
-            <a:ext cx="5689800" cy="860400"/>
+            <a:ext cx="5688720" cy="859320"/>
           </a:xfrm>
           <a:prstGeom prst="rect">
             <a:avLst/>
@@ -4212,7 +4212,7 @@
         <p:spPr>
           <a:xfrm>
             <a:off x="3312000" y="2232000"/>
-            <a:ext cx="5684400" cy="1099080"/>
+            <a:ext cx="5683320" cy="1098000"/>
           </a:xfrm>
           <a:prstGeom prst="rect">
             <a:avLst/>
@@ -4374,7 +4374,7 @@
         <p:spPr>
           <a:xfrm>
             <a:off x="448920" y="433800"/>
-            <a:ext cx="8242560" cy="607320"/>
+            <a:ext cx="8241480" cy="606240"/>
           </a:xfrm>
           <a:prstGeom prst="rect">
             <a:avLst/>
@@ -4436,7 +4436,7 @@
         <p:spPr>
           <a:xfrm>
             <a:off x="448920" y="1350000"/>
-            <a:ext cx="8242560" cy="3508560"/>
+            <a:ext cx="8241480" cy="3507480"/>
           </a:xfrm>
           <a:prstGeom prst="rect">
             <a:avLst/>
@@ -4455,7 +4455,7 @@
         <p:txBody>
           <a:bodyPr lIns="0" rIns="0" tIns="0" bIns="0"/>
           <a:p>
-            <a:pPr marL="216000" indent="-214200">
+            <a:pPr marL="216000" indent="-213120">
               <a:lnSpc>
                 <a:spcPct val="100000"/>
               </a:lnSpc>
@@ -4543,7 +4543,7 @@
         <p:spPr>
           <a:xfrm>
             <a:off x="182880" y="1737360"/>
-            <a:ext cx="2655720" cy="2285280"/>
+            <a:ext cx="2654640" cy="2284200"/>
           </a:xfrm>
           <a:prstGeom prst="rect">
             <a:avLst/>
@@ -4566,7 +4566,7 @@
         <p:spPr>
           <a:xfrm>
             <a:off x="3373920" y="1737360"/>
-            <a:ext cx="2386080" cy="2285280"/>
+            <a:ext cx="2385000" cy="2284200"/>
           </a:xfrm>
           <a:prstGeom prst="rect">
             <a:avLst/>
@@ -4589,7 +4589,7 @@
         <p:spPr>
           <a:xfrm>
             <a:off x="6092280" y="1828800"/>
-            <a:ext cx="2685240" cy="2010960"/>
+            <a:ext cx="2684160" cy="2009880"/>
           </a:xfrm>
           <a:prstGeom prst="rect">
             <a:avLst/>
@@ -4657,7 +4657,7 @@
         <p:spPr>
           <a:xfrm>
             <a:off x="808560" y="397080"/>
-            <a:ext cx="8242560" cy="607320"/>
+            <a:ext cx="8241480" cy="606240"/>
           </a:xfrm>
           <a:prstGeom prst="rect">
             <a:avLst/>
@@ -4734,7 +4734,7 @@
         <p:spPr>
           <a:xfrm>
             <a:off x="182880" y="1153440"/>
-            <a:ext cx="4754160" cy="3875040"/>
+            <a:ext cx="3931920" cy="3873960"/>
           </a:xfrm>
           <a:prstGeom prst="rect">
             <a:avLst/>
@@ -4753,7 +4753,7 @@
         <p:txBody>
           <a:bodyPr lIns="0" rIns="0" tIns="0" bIns="0"/>
           <a:p>
-            <a:pPr marL="216000" indent="-214200">
+            <a:pPr marL="216000" indent="-213120">
               <a:lnSpc>
                 <a:spcPct val="100000"/>
               </a:lnSpc>
@@ -4791,7 +4791,7 @@
             </a:endParaRPr>
           </a:p>
           <a:p>
-            <a:pPr marL="216000" indent="-214200">
+            <a:pPr marL="216000" indent="-213120">
               <a:lnSpc>
                 <a:spcPct val="100000"/>
               </a:lnSpc>
@@ -4814,7 +4814,7 @@
                 <a:latin typeface="Calibri"/>
                 <a:ea typeface="DejaVu Sans"/>
               </a:rPr>
-              <a:t>Ingeniero en Sistemas de </a:t>
+              <a:t>Ingeniero en Sistemas de Universidad de San Carlos</a:t>
             </a:r>
             <a:endParaRPr b="0" lang="en-US" sz="1800" spc="-1" strike="noStrike">
               <a:solidFill>
@@ -4829,7 +4829,7 @@
             </a:endParaRPr>
           </a:p>
           <a:p>
-            <a:pPr marL="216000" indent="-214200">
+            <a:pPr marL="216000" indent="-213120">
               <a:lnSpc>
                 <a:spcPct val="100000"/>
               </a:lnSpc>
@@ -4852,7 +4852,7 @@
                 <a:latin typeface="Calibri"/>
                 <a:ea typeface="DejaVu Sans"/>
               </a:rPr>
-              <a:t>Universidad de San Carlos</a:t>
+              <a:t>Mentor del curso “Machine Learning Fundations:a case study approach” de la universidad de Washington en Coursera</a:t>
             </a:r>
             <a:endParaRPr b="0" lang="en-US" sz="1800" spc="-1" strike="noStrike">
               <a:solidFill>
@@ -4867,7 +4867,7 @@
             </a:endParaRPr>
           </a:p>
           <a:p>
-            <a:pPr marL="216000" indent="-214200">
+            <a:pPr marL="216000" indent="-213120">
               <a:lnSpc>
                 <a:spcPct val="100000"/>
               </a:lnSpc>
@@ -4890,7 +4890,7 @@
                 <a:latin typeface="Calibri"/>
                 <a:ea typeface="DejaVu Sans"/>
               </a:rPr>
-              <a:t>Mentor del curso </a:t>
+              <a:t>Mas de 10 Certificaciones y cursos en la materia incluyendo : “Deep learning nanodegree”</a:t>
             </a:r>
             <a:endParaRPr b="0" lang="en-US" sz="1800" spc="-1" strike="noStrike">
               <a:solidFill>
@@ -4905,7 +4905,7 @@
             </a:endParaRPr>
           </a:p>
           <a:p>
-            <a:pPr marL="216000" indent="-214200">
+            <a:pPr marL="216000" indent="-213120">
               <a:lnSpc>
                 <a:spcPct val="100000"/>
               </a:lnSpc>
@@ -4928,22 +4928,7 @@
                 <a:latin typeface="Calibri"/>
                 <a:ea typeface="DejaVu Sans"/>
               </a:rPr>
-              <a:t>“</a:t>
-            </a:r>
-            <a:r>
-              <a:rPr b="0" lang="en-US" sz="1400" spc="-1" strike="noStrike">
-                <a:solidFill>
-                  <a:srgbClr val="000000"/>
-                </a:solidFill>
-                <a:uFill>
-                  <a:solidFill>
-                    <a:srgbClr val="ffffff"/>
-                  </a:solidFill>
-                </a:uFill>
-                <a:latin typeface="Calibri"/>
-                <a:ea typeface="DejaVu Sans"/>
-              </a:rPr>
-              <a:t>Machine Learning Fundations:</a:t>
+              <a:t>Data scientist/data engineer en Xoom/PayPal</a:t>
             </a:r>
             <a:endParaRPr b="0" lang="en-US" sz="1800" spc="-1" strike="noStrike">
               <a:solidFill>
@@ -4958,273 +4943,7 @@
             </a:endParaRPr>
           </a:p>
           <a:p>
-            <a:pPr marL="216000" indent="-214200">
-              <a:lnSpc>
-                <a:spcPct val="100000"/>
-              </a:lnSpc>
-              <a:buClr>
-                <a:srgbClr val="000000"/>
-              </a:buClr>
-              <a:buFont typeface="Arial"/>
-              <a:buChar char="•"/>
-            </a:pPr>
-            <a:r>
-              <a:rPr b="0" lang="en-US" sz="1400" spc="-1" strike="noStrike">
-                <a:solidFill>
-                  <a:srgbClr val="000000"/>
-                </a:solidFill>
-                <a:uFill>
-                  <a:solidFill>
-                    <a:srgbClr val="ffffff"/>
-                  </a:solidFill>
-                </a:uFill>
-                <a:latin typeface="Calibri"/>
-                <a:ea typeface="DejaVu Sans"/>
-              </a:rPr>
-              <a:t>a case study approach” de la </a:t>
-            </a:r>
-            <a:endParaRPr b="0" lang="en-US" sz="1800" spc="-1" strike="noStrike">
-              <a:solidFill>
-                <a:srgbClr val="000000"/>
-              </a:solidFill>
-              <a:uFill>
-                <a:solidFill>
-                  <a:srgbClr val="ffffff"/>
-                </a:solidFill>
-              </a:uFill>
-              <a:latin typeface="Arial"/>
-            </a:endParaRPr>
-          </a:p>
-          <a:p>
-            <a:pPr marL="216000" indent="-214200">
-              <a:lnSpc>
-                <a:spcPct val="100000"/>
-              </a:lnSpc>
-              <a:buClr>
-                <a:srgbClr val="000000"/>
-              </a:buClr>
-              <a:buFont typeface="Arial"/>
-              <a:buChar char="•"/>
-            </a:pPr>
-            <a:r>
-              <a:rPr b="0" lang="en-US" sz="1400" spc="-1" strike="noStrike">
-                <a:solidFill>
-                  <a:srgbClr val="000000"/>
-                </a:solidFill>
-                <a:uFill>
-                  <a:solidFill>
-                    <a:srgbClr val="ffffff"/>
-                  </a:solidFill>
-                </a:uFill>
-                <a:latin typeface="Calibri"/>
-                <a:ea typeface="DejaVu Sans"/>
-              </a:rPr>
-              <a:t>universidad de Washington en </a:t>
-            </a:r>
-            <a:endParaRPr b="0" lang="en-US" sz="1800" spc="-1" strike="noStrike">
-              <a:solidFill>
-                <a:srgbClr val="000000"/>
-              </a:solidFill>
-              <a:uFill>
-                <a:solidFill>
-                  <a:srgbClr val="ffffff"/>
-                </a:solidFill>
-              </a:uFill>
-              <a:latin typeface="Arial"/>
-            </a:endParaRPr>
-          </a:p>
-          <a:p>
-            <a:pPr marL="216000" indent="-214200">
-              <a:lnSpc>
-                <a:spcPct val="100000"/>
-              </a:lnSpc>
-              <a:buClr>
-                <a:srgbClr val="000000"/>
-              </a:buClr>
-              <a:buFont typeface="Arial"/>
-              <a:buChar char="•"/>
-            </a:pPr>
-            <a:r>
-              <a:rPr b="0" lang="en-US" sz="1400" spc="-1" strike="noStrike">
-                <a:solidFill>
-                  <a:srgbClr val="000000"/>
-                </a:solidFill>
-                <a:uFill>
-                  <a:solidFill>
-                    <a:srgbClr val="ffffff"/>
-                  </a:solidFill>
-                </a:uFill>
-                <a:latin typeface="Calibri"/>
-                <a:ea typeface="DejaVu Sans"/>
-              </a:rPr>
-              <a:t>Coursera</a:t>
-            </a:r>
-            <a:endParaRPr b="0" lang="en-US" sz="1800" spc="-1" strike="noStrike">
-              <a:solidFill>
-                <a:srgbClr val="000000"/>
-              </a:solidFill>
-              <a:uFill>
-                <a:solidFill>
-                  <a:srgbClr val="ffffff"/>
-                </a:solidFill>
-              </a:uFill>
-              <a:latin typeface="Arial"/>
-            </a:endParaRPr>
-          </a:p>
-          <a:p>
-            <a:pPr marL="216000" indent="-214200">
-              <a:lnSpc>
-                <a:spcPct val="100000"/>
-              </a:lnSpc>
-              <a:buClr>
-                <a:srgbClr val="000000"/>
-              </a:buClr>
-              <a:buFont typeface="Arial"/>
-              <a:buChar char="•"/>
-            </a:pPr>
-            <a:r>
-              <a:rPr b="0" lang="en-US" sz="1400" spc="-1" strike="noStrike">
-                <a:solidFill>
-                  <a:srgbClr val="000000"/>
-                </a:solidFill>
-                <a:uFill>
-                  <a:solidFill>
-                    <a:srgbClr val="ffffff"/>
-                  </a:solidFill>
-                </a:uFill>
-                <a:latin typeface="Calibri"/>
-                <a:ea typeface="DejaVu Sans"/>
-              </a:rPr>
-              <a:t>Mas de 10 Certificaciones y cursos</a:t>
-            </a:r>
-            <a:endParaRPr b="0" lang="en-US" sz="1800" spc="-1" strike="noStrike">
-              <a:solidFill>
-                <a:srgbClr val="000000"/>
-              </a:solidFill>
-              <a:uFill>
-                <a:solidFill>
-                  <a:srgbClr val="ffffff"/>
-                </a:solidFill>
-              </a:uFill>
-              <a:latin typeface="Arial"/>
-            </a:endParaRPr>
-          </a:p>
-          <a:p>
-            <a:pPr marL="216000" indent="-214200">
-              <a:lnSpc>
-                <a:spcPct val="100000"/>
-              </a:lnSpc>
-              <a:buClr>
-                <a:srgbClr val="000000"/>
-              </a:buClr>
-              <a:buFont typeface="Arial"/>
-              <a:buChar char="•"/>
-            </a:pPr>
-            <a:r>
-              <a:rPr b="0" lang="en-US" sz="1400" spc="-1" strike="noStrike">
-                <a:solidFill>
-                  <a:srgbClr val="000000"/>
-                </a:solidFill>
-                <a:uFill>
-                  <a:solidFill>
-                    <a:srgbClr val="ffffff"/>
-                  </a:solidFill>
-                </a:uFill>
-                <a:latin typeface="Calibri"/>
-                <a:ea typeface="DejaVu Sans"/>
-              </a:rPr>
-              <a:t>en la materia incluyendo : “Deep learning nanodegree”</a:t>
-            </a:r>
-            <a:endParaRPr b="0" lang="en-US" sz="1800" spc="-1" strike="noStrike">
-              <a:solidFill>
-                <a:srgbClr val="000000"/>
-              </a:solidFill>
-              <a:uFill>
-                <a:solidFill>
-                  <a:srgbClr val="ffffff"/>
-                </a:solidFill>
-              </a:uFill>
-              <a:latin typeface="Arial"/>
-            </a:endParaRPr>
-          </a:p>
-          <a:p>
-            <a:pPr marL="216000" indent="-214200">
-              <a:lnSpc>
-                <a:spcPct val="100000"/>
-              </a:lnSpc>
-              <a:buClr>
-                <a:srgbClr val="000000"/>
-              </a:buClr>
-              <a:buFont typeface="Arial"/>
-              <a:buChar char="•"/>
-            </a:pPr>
-            <a:r>
-              <a:rPr b="0" lang="en-US" sz="1400" spc="-1" strike="noStrike">
-                <a:solidFill>
-                  <a:srgbClr val="000000"/>
-                </a:solidFill>
-                <a:uFill>
-                  <a:solidFill>
-                    <a:srgbClr val="ffffff"/>
-                  </a:solidFill>
-                </a:uFill>
-                <a:latin typeface="Calibri"/>
-                <a:ea typeface="DejaVu Sans"/>
-              </a:rPr>
-              <a:t>Data scientist/data engineer</a:t>
-            </a:r>
-            <a:endParaRPr b="0" lang="en-US" sz="1800" spc="-1" strike="noStrike">
-              <a:solidFill>
-                <a:srgbClr val="000000"/>
-              </a:solidFill>
-              <a:uFill>
-                <a:solidFill>
-                  <a:srgbClr val="ffffff"/>
-                </a:solidFill>
-              </a:uFill>
-              <a:latin typeface="Arial"/>
-            </a:endParaRPr>
-          </a:p>
-          <a:p>
-            <a:pPr marL="216000" indent="-214200">
-              <a:lnSpc>
-                <a:spcPct val="100000"/>
-              </a:lnSpc>
-              <a:buClr>
-                <a:srgbClr val="000000"/>
-              </a:buClr>
-              <a:buFont typeface="Arial"/>
-              <a:buChar char="•"/>
-            </a:pPr>
-            <a:r>
-              <a:rPr b="0" lang="en-US" sz="1400" spc="-1" strike="noStrike">
-                <a:solidFill>
-                  <a:srgbClr val="000000"/>
-                </a:solidFill>
-                <a:uFill>
-                  <a:solidFill>
-                    <a:srgbClr val="ffffff"/>
-                  </a:solidFill>
-                </a:uFill>
-                <a:latin typeface="Calibri"/>
-                <a:ea typeface="DejaVu Sans"/>
-              </a:rPr>
-              <a:t>en Xoom/PayPal</a:t>
-            </a:r>
-            <a:endParaRPr b="0" lang="en-US" sz="1800" spc="-1" strike="noStrike">
-              <a:solidFill>
-                <a:srgbClr val="000000"/>
-              </a:solidFill>
-              <a:uFill>
-                <a:solidFill>
-                  <a:srgbClr val="ffffff"/>
-                </a:solidFill>
-              </a:uFill>
-              <a:latin typeface="Arial"/>
-            </a:endParaRPr>
-          </a:p>
-          <a:p>
-            <a:pPr marL="216000" indent="-214200">
+            <a:pPr marL="216000" indent="-213120">
               <a:lnSpc>
                 <a:spcPct val="100000"/>
               </a:lnSpc>
@@ -5262,7 +4981,7 @@
             </a:endParaRPr>
           </a:p>
           <a:p>
-            <a:pPr marL="216000" indent="-214200">
+            <a:pPr marL="216000" indent="-213120">
               <a:lnSpc>
                 <a:spcPct val="100000"/>
               </a:lnSpc>
@@ -5285,45 +5004,7 @@
                 <a:latin typeface="Calibri"/>
                 <a:ea typeface="DejaVu Sans"/>
               </a:rPr>
-              <a:t>Creador de AI que publicó en Amazon </a:t>
-            </a:r>
-            <a:endParaRPr b="0" lang="en-US" sz="1800" spc="-1" strike="noStrike">
-              <a:solidFill>
-                <a:srgbClr val="000000"/>
-              </a:solidFill>
-              <a:uFill>
-                <a:solidFill>
-                  <a:srgbClr val="ffffff"/>
-                </a:solidFill>
-              </a:uFill>
-              <a:latin typeface="Arial"/>
-            </a:endParaRPr>
-          </a:p>
-          <a:p>
-            <a:pPr marL="216000" indent="-214200">
-              <a:lnSpc>
-                <a:spcPct val="100000"/>
-              </a:lnSpc>
-              <a:buClr>
-                <a:srgbClr val="000000"/>
-              </a:buClr>
-              <a:buFont typeface="Arial"/>
-              <a:buChar char="•"/>
-            </a:pPr>
-            <a:r>
-              <a:rPr b="0" lang="en-US" sz="1400" spc="-1" strike="noStrike">
-                <a:solidFill>
-                  <a:srgbClr val="000000"/>
-                </a:solidFill>
-                <a:uFill>
-                  <a:solidFill>
-                    <a:srgbClr val="ffffff"/>
-                  </a:solidFill>
-                </a:uFill>
-                <a:latin typeface="Calibri"/>
-                <a:ea typeface="DejaVu Sans"/>
-              </a:rPr>
-              <a:t>una historia de terror</a:t>
+              <a:t>Creador de AI que publicó en Amazon una historia de terror</a:t>
             </a:r>
             <a:r>
               <a:rPr b="0" lang="en-US" sz="1500" spc="-1" strike="noStrike">
@@ -5399,7 +5080,7 @@
         <p:spPr>
           <a:xfrm>
             <a:off x="182880" y="1247040"/>
-            <a:ext cx="3381840" cy="1668960"/>
+            <a:ext cx="3380760" cy="1667880"/>
           </a:xfrm>
           <a:prstGeom prst="rect">
             <a:avLst/>
@@ -5456,7 +5137,7 @@
         <p:spPr>
           <a:xfrm>
             <a:off x="4493520" y="1188720"/>
-            <a:ext cx="4466160" cy="1894680"/>
+            <a:ext cx="4465080" cy="1893600"/>
           </a:xfrm>
           <a:prstGeom prst="rect">
             <a:avLst/>
@@ -5482,7 +5163,7 @@
         <p:spPr>
           <a:xfrm>
             <a:off x="5120640" y="1188720"/>
-            <a:ext cx="3931200" cy="3199680"/>
+            <a:ext cx="3930120" cy="3198600"/>
           </a:xfrm>
           <a:prstGeom prst="rect">
             <a:avLst/>
@@ -5501,7 +5182,7 @@
         <p:txBody>
           <a:bodyPr lIns="0" rIns="0" tIns="0" bIns="0"/>
           <a:p>
-            <a:pPr marL="216000" indent="-214200">
+            <a:pPr marL="216000" indent="-213120">
               <a:lnSpc>
                 <a:spcPct val="100000"/>
               </a:lnSpc>
@@ -5539,7 +5220,7 @@
             </a:endParaRPr>
           </a:p>
           <a:p>
-            <a:pPr marL="216000" indent="-214200">
+            <a:pPr marL="216000" indent="-213120">
               <a:lnSpc>
                 <a:spcPct val="100000"/>
               </a:lnSpc>
@@ -5562,7 +5243,7 @@
                 <a:latin typeface="Calibri"/>
                 <a:ea typeface="DejaVu Sans"/>
               </a:rPr>
-              <a:t>Ingeniero en Sistemas de </a:t>
+              <a:t>Ingeniero en Sistemas de Universidad de San Carlos</a:t>
             </a:r>
             <a:endParaRPr b="0" lang="en-US" sz="1800" spc="-1" strike="noStrike">
               <a:solidFill>
@@ -5577,7 +5258,7 @@
             </a:endParaRPr>
           </a:p>
           <a:p>
-            <a:pPr marL="216000" indent="-214200">
+            <a:pPr marL="216000" indent="-213120">
               <a:lnSpc>
                 <a:spcPct val="100000"/>
               </a:lnSpc>
@@ -5600,7 +5281,7 @@
                 <a:latin typeface="Calibri"/>
                 <a:ea typeface="DejaVu Sans"/>
               </a:rPr>
-              <a:t>Universidad de San Carlos</a:t>
+              <a:t>Graduado de “Deep learning</a:t>
             </a:r>
             <a:endParaRPr b="0" lang="en-US" sz="1800" spc="-1" strike="noStrike">
               <a:solidFill>
@@ -5615,45 +5296,7 @@
             </a:endParaRPr>
           </a:p>
           <a:p>
-            <a:pPr marL="216000" indent="-214200">
-              <a:lnSpc>
-                <a:spcPct val="100000"/>
-              </a:lnSpc>
-              <a:buClr>
-                <a:srgbClr val="000000"/>
-              </a:buClr>
-              <a:buFont typeface="Arial"/>
-              <a:buChar char="•"/>
-            </a:pPr>
-            <a:r>
-              <a:rPr b="0" lang="en-US" sz="1500" spc="-1" strike="noStrike">
-                <a:solidFill>
-                  <a:srgbClr val="000000"/>
-                </a:solidFill>
-                <a:uFill>
-                  <a:solidFill>
-                    <a:srgbClr val="ffffff"/>
-                  </a:solidFill>
-                </a:uFill>
-                <a:latin typeface="Calibri"/>
-                <a:ea typeface="DejaVu Sans"/>
-              </a:rPr>
-              <a:t>Graduado de “Deep learning </a:t>
-            </a:r>
-            <a:endParaRPr b="0" lang="en-US" sz="1800" spc="-1" strike="noStrike">
-              <a:solidFill>
-                <a:srgbClr val="000000"/>
-              </a:solidFill>
-              <a:uFill>
-                <a:solidFill>
-                  <a:srgbClr val="ffffff"/>
-                </a:solidFill>
-              </a:uFill>
-              <a:latin typeface="Arial"/>
-            </a:endParaRPr>
-          </a:p>
-          <a:p>
-            <a:pPr marL="216000" indent="-214200">
+            <a:pPr marL="216000" indent="-213120">
               <a:lnSpc>
                 <a:spcPct val="100000"/>
               </a:lnSpc>
@@ -5691,7 +5334,7 @@
             </a:endParaRPr>
           </a:p>
           <a:p>
-            <a:pPr marL="216000" indent="-214200">
+            <a:pPr marL="216000" indent="-213120">
               <a:lnSpc>
                 <a:spcPct val="100000"/>
               </a:lnSpc>
@@ -5714,45 +5357,7 @@
                 <a:latin typeface="Calibri"/>
                 <a:ea typeface="DejaVu Sans"/>
               </a:rPr>
-              <a:t>Data scientist/data engineer</a:t>
-            </a:r>
-            <a:endParaRPr b="0" lang="en-US" sz="1800" spc="-1" strike="noStrike">
-              <a:solidFill>
-                <a:srgbClr val="000000"/>
-              </a:solidFill>
-              <a:uFill>
-                <a:solidFill>
-                  <a:srgbClr val="ffffff"/>
-                </a:solidFill>
-              </a:uFill>
-              <a:latin typeface="Arial"/>
-            </a:endParaRPr>
-          </a:p>
-          <a:p>
-            <a:pPr marL="216000" indent="-214200">
-              <a:lnSpc>
-                <a:spcPct val="100000"/>
-              </a:lnSpc>
-              <a:buClr>
-                <a:srgbClr val="000000"/>
-              </a:buClr>
-              <a:buFont typeface="Arial"/>
-              <a:buChar char="•"/>
-            </a:pPr>
-            <a:r>
-              <a:rPr b="0" lang="en-US" sz="1500" spc="-1" strike="noStrike">
-                <a:solidFill>
-                  <a:srgbClr val="000000"/>
-                </a:solidFill>
-                <a:uFill>
-                  <a:solidFill>
-                    <a:srgbClr val="ffffff"/>
-                  </a:solidFill>
-                </a:uFill>
-                <a:latin typeface="Calibri"/>
-                <a:ea typeface="DejaVu Sans"/>
-              </a:rPr>
-              <a:t>en Xoom/PayPal</a:t>
+              <a:t>Data scientist/data engineer en Xoom/PayPal</a:t>
             </a:r>
             <a:endParaRPr b="0" lang="en-US" sz="1800" spc="-1" strike="noStrike">
               <a:solidFill>
@@ -5795,7 +5400,7 @@
         <p:spPr>
           <a:xfrm>
             <a:off x="1610280" y="4754880"/>
-            <a:ext cx="6253560" cy="342720"/>
+            <a:ext cx="6252480" cy="341640"/>
           </a:xfrm>
           <a:prstGeom prst="rect">
             <a:avLst/>
@@ -5814,7 +5419,7 @@
         <p:txBody>
           <a:bodyPr lIns="90000" rIns="90000" tIns="45000" bIns="45000"/>
           <a:p>
-            <a:pPr marL="216000" indent="-215280">
+            <a:pPr marL="216000" indent="-214200">
               <a:lnSpc>
                 <a:spcPct val="100000"/>
               </a:lnSpc>
@@ -5912,7 +5517,7 @@
         <p:spPr>
           <a:xfrm>
             <a:off x="808560" y="397080"/>
-            <a:ext cx="8242560" cy="607320"/>
+            <a:ext cx="8241480" cy="606240"/>
           </a:xfrm>
           <a:prstGeom prst="rect">
             <a:avLst/>
@@ -5989,7 +5594,7 @@
         <p:spPr>
           <a:xfrm>
             <a:off x="182880" y="1188720"/>
-            <a:ext cx="4571280" cy="3565440"/>
+            <a:ext cx="4570200" cy="3564360"/>
           </a:xfrm>
           <a:prstGeom prst="rect">
             <a:avLst/>
@@ -6008,6 +5613,11 @@
         <p:txBody>
           <a:bodyPr lIns="0" rIns="0" tIns="0" bIns="0"/>
           <a:p>
+            <a:pPr>
+              <a:lnSpc>
+                <a:spcPct val="100000"/>
+              </a:lnSpc>
+            </a:pPr>
             <a:r>
               <a:rPr b="1" lang="en-US" sz="1600" spc="-1" strike="noStrike">
                 <a:solidFill>
@@ -6023,29 +5633,22 @@
               </a:rPr>
               <a:t>Queremos conocerlos:</a:t>
             </a:r>
-            <a:endParaRPr b="0" lang="en-US" sz="1800" spc="-1" strike="noStrike">
-              <a:solidFill>
-                <a:srgbClr val="000000"/>
-              </a:solidFill>
-              <a:uFill>
-                <a:solidFill>
-                  <a:srgbClr val="ffffff"/>
-                </a:solidFill>
-              </a:uFill>
-              <a:latin typeface="Arial"/>
-            </a:endParaRPr>
-          </a:p>
-          <a:p>
-            <a:pPr marL="216000" indent="-214200">
-              <a:lnSpc>
-                <a:spcPct val="100000"/>
-              </a:lnSpc>
-              <a:buClr>
-                <a:srgbClr val="000000"/>
-              </a:buClr>
-              <a:buFont typeface="Arial"/>
-              <a:buChar char="•"/>
-            </a:pPr>
+            <a:r>
+              <a:rPr b="1" lang="en-US" sz="1600" spc="-1" strike="noStrike">
+                <a:solidFill>
+                  <a:srgbClr val="000000"/>
+                </a:solidFill>
+                <a:uFill>
+                  <a:solidFill>
+                    <a:srgbClr val="ffffff"/>
+                  </a:solidFill>
+                </a:uFill>
+                <a:latin typeface="Calibri"/>
+                <a:ea typeface="DejaVu Sans"/>
+              </a:rPr>
+              <a:t>
+</a:t>
+            </a:r>
             <a:r>
               <a:rPr b="1" lang="en-US" sz="1600" spc="-1" strike="noStrike">
                 <a:solidFill>
@@ -6074,7 +5677,7 @@
             </a:endParaRPr>
           </a:p>
           <a:p>
-            <a:pPr marL="216000" indent="-214200">
+            <a:pPr marL="216000" indent="-213120">
               <a:lnSpc>
                 <a:spcPct val="100000"/>
               </a:lnSpc>
@@ -6112,7 +5715,7 @@
             </a:endParaRPr>
           </a:p>
           <a:p>
-            <a:pPr marL="216000" indent="-214200">
+            <a:pPr marL="216000" indent="-213120">
               <a:lnSpc>
                 <a:spcPct val="100000"/>
               </a:lnSpc>
@@ -6150,7 +5753,7 @@
             </a:endParaRPr>
           </a:p>
           <a:p>
-            <a:pPr marL="216000" indent="-214200">
+            <a:pPr marL="216000" indent="-213120">
               <a:lnSpc>
                 <a:spcPct val="100000"/>
               </a:lnSpc>
@@ -6188,7 +5791,7 @@
             </a:endParaRPr>
           </a:p>
           <a:p>
-            <a:pPr marL="216000" indent="-214200">
+            <a:pPr marL="216000" indent="-213120">
               <a:lnSpc>
                 <a:spcPct val="100000"/>
               </a:lnSpc>
@@ -6272,7 +5875,7 @@
         <p:spPr>
           <a:xfrm>
             <a:off x="182880" y="1247040"/>
-            <a:ext cx="3381840" cy="1668960"/>
+            <a:ext cx="3380760" cy="1667880"/>
           </a:xfrm>
           <a:prstGeom prst="rect">
             <a:avLst/>
@@ -6329,7 +5932,7 @@
         <p:spPr>
           <a:xfrm>
             <a:off x="4493520" y="1188720"/>
-            <a:ext cx="4466160" cy="1894680"/>
+            <a:ext cx="4465080" cy="1893600"/>
           </a:xfrm>
           <a:prstGeom prst="rect">
             <a:avLst/>

</xml_diff>